<commit_message>
Java doc ausprobiert und intel erstellt
</commit_message>
<xml_diff>
--- a/4_Praesentation/DV-Projekt.pptx
+++ b/4_Praesentation/DV-Projekt.pptx
@@ -111,6 +111,11 @@
       </a:defRPr>
     </a:lvl9pPr>
   </p:defaultTextStyle>
+  <p:extLst>
+    <p:ext uri="{EFAFB233-063F-42B5-8137-9DF3F51BA10A}">
+      <p15:sldGuideLst xmlns:p15="http://schemas.microsoft.com/office/powerpoint/2012/main"/>
+    </p:ext>
+  </p:extLst>
 </p:presentation>
 </file>
 
@@ -358,7 +363,7 @@
           <a:p>
             <a:fld id="{9184DA70-C731-4C70-880D-CCD4705E623C}" type="datetime1">
               <a:rPr lang="en-US" smtClean="0"/>
-              <a:t>6/16/2022</a:t>
+              <a:t>6/18/2022</a:t>
             </a:fld>
             <a:endParaRPr lang="en-US" dirty="0"/>
           </a:p>
@@ -546,7 +551,7 @@
           <a:p>
             <a:fld id="{B612A279-0833-481D-8C56-F67FD0AC6C50}" type="datetime1">
               <a:rPr lang="en-US" smtClean="0"/>
-              <a:t>6/16/2022</a:t>
+              <a:t>6/18/2022</a:t>
             </a:fld>
             <a:endParaRPr lang="en-US" dirty="0"/>
           </a:p>
@@ -788,7 +793,7 @@
           <a:p>
             <a:fld id="{6587DA83-5663-4C9C-B9AA-0B40A3DAFF81}" type="datetime1">
               <a:rPr lang="en-US" smtClean="0"/>
-              <a:t>6/16/2022</a:t>
+              <a:t>6/18/2022</a:t>
             </a:fld>
             <a:endParaRPr lang="en-US" dirty="0"/>
           </a:p>
@@ -3208,7 +3213,7 @@
           <a:p>
             <a:fld id="{3C04E684-10F4-4CC3-A0B9-F03AA7BE37CF}" type="datetimeFigureOut">
               <a:rPr lang="en-US" smtClean="0"/>
-              <a:t>6/16/2022</a:t>
+              <a:t>6/18/2022</a:t>
             </a:fld>
             <a:endParaRPr lang="en-US"/>
           </a:p>
@@ -3945,7 +3950,7 @@
           <a:p>
             <a:fld id="{3C04E684-10F4-4CC3-A0B9-F03AA7BE37CF}" type="datetimeFigureOut">
               <a:rPr lang="en-US" smtClean="0"/>
-              <a:t>6/16/2022</a:t>
+              <a:t>6/18/2022</a:t>
             </a:fld>
             <a:endParaRPr lang="en-US"/>
           </a:p>
@@ -4587,7 +4592,7 @@
           <a:p>
             <a:fld id="{3C04E684-10F4-4CC3-A0B9-F03AA7BE37CF}" type="datetimeFigureOut">
               <a:rPr lang="en-US" smtClean="0"/>
-              <a:t>6/16/2022</a:t>
+              <a:t>6/18/2022</a:t>
             </a:fld>
             <a:endParaRPr lang="en-US"/>
           </a:p>
@@ -5387,7 +5392,7 @@
           <a:p>
             <a:fld id="{3C04E684-10F4-4CC3-A0B9-F03AA7BE37CF}" type="datetimeFigureOut">
               <a:rPr lang="en-US" smtClean="0"/>
-              <a:t>6/16/2022</a:t>
+              <a:t>6/18/2022</a:t>
             </a:fld>
             <a:endParaRPr lang="en-US"/>
           </a:p>
@@ -6338,7 +6343,7 @@
           <a:p>
             <a:fld id="{3C04E684-10F4-4CC3-A0B9-F03AA7BE37CF}" type="datetimeFigureOut">
               <a:rPr lang="en-US" smtClean="0"/>
-              <a:t>6/16/2022</a:t>
+              <a:t>6/18/2022</a:t>
             </a:fld>
             <a:endParaRPr lang="en-US"/>
           </a:p>
@@ -8687,7 +8692,7 @@
           <a:p>
             <a:fld id="{3C04E684-10F4-4CC3-A0B9-F03AA7BE37CF}" type="datetimeFigureOut">
               <a:rPr lang="en-US" smtClean="0"/>
-              <a:t>6/16/2022</a:t>
+              <a:t>6/18/2022</a:t>
             </a:fld>
             <a:endParaRPr lang="en-US"/>
           </a:p>
@@ -8800,7 +8805,7 @@
           <a:p>
             <a:fld id="{3C04E684-10F4-4CC3-A0B9-F03AA7BE37CF}" type="datetimeFigureOut">
               <a:rPr lang="en-US" smtClean="0"/>
-              <a:t>6/16/2022</a:t>
+              <a:t>6/18/2022</a:t>
             </a:fld>
             <a:endParaRPr lang="en-US"/>
           </a:p>
@@ -9307,7 +9312,7 @@
           <a:p>
             <a:fld id="{3C04E684-10F4-4CC3-A0B9-F03AA7BE37CF}" type="datetimeFigureOut">
               <a:rPr lang="en-US" smtClean="0"/>
-              <a:t>6/16/2022</a:t>
+              <a:t>6/18/2022</a:t>
             </a:fld>
             <a:endParaRPr lang="en-US"/>
           </a:p>
@@ -9495,7 +9500,7 @@
           <a:p>
             <a:fld id="{4BE1D723-8F53-4F53-90B0-1982A396982E}" type="datetime1">
               <a:rPr lang="en-US" smtClean="0"/>
-              <a:t>6/16/2022</a:t>
+              <a:t>6/18/2022</a:t>
             </a:fld>
             <a:endParaRPr lang="en-US" dirty="0"/>
           </a:p>
@@ -10798,7 +10803,7 @@
           <a:p>
             <a:fld id="{3C04E684-10F4-4CC3-A0B9-F03AA7BE37CF}" type="datetimeFigureOut">
               <a:rPr lang="en-US" smtClean="0"/>
-              <a:t>6/16/2022</a:t>
+              <a:t>6/18/2022</a:t>
             </a:fld>
             <a:endParaRPr lang="en-US"/>
           </a:p>
@@ -13292,7 +13297,7 @@
           <a:p>
             <a:fld id="{3C04E684-10F4-4CC3-A0B9-F03AA7BE37CF}" type="datetimeFigureOut">
               <a:rPr lang="en-US" smtClean="0"/>
-              <a:t>6/16/2022</a:t>
+              <a:t>6/18/2022</a:t>
             </a:fld>
             <a:endParaRPr lang="en-US"/>
           </a:p>
@@ -13490,7 +13495,7 @@
           <a:p>
             <a:fld id="{3C04E684-10F4-4CC3-A0B9-F03AA7BE37CF}" type="datetimeFigureOut">
               <a:rPr lang="en-US" smtClean="0"/>
-              <a:t>6/16/2022</a:t>
+              <a:t>6/18/2022</a:t>
             </a:fld>
             <a:endParaRPr lang="en-US"/>
           </a:p>
@@ -13698,7 +13703,7 @@
           <a:p>
             <a:fld id="{3C04E684-10F4-4CC3-A0B9-F03AA7BE37CF}" type="datetimeFigureOut">
               <a:rPr lang="en-US" smtClean="0"/>
-              <a:t>6/16/2022</a:t>
+              <a:t>6/18/2022</a:t>
             </a:fld>
             <a:endParaRPr lang="en-US"/>
           </a:p>
@@ -14071,7 +14076,7 @@
           <a:p>
             <a:fld id="{97669AF7-7BEB-44E4-9852-375E34362B5B}" type="datetime1">
               <a:rPr lang="en-US" smtClean="0"/>
-              <a:t>6/16/2022</a:t>
+              <a:t>6/18/2022</a:t>
             </a:fld>
             <a:endParaRPr lang="en-US" dirty="0"/>
           </a:p>
@@ -14326,7 +14331,7 @@
           <a:p>
             <a:fld id="{BAAAC38D-0552-4C82-B593-E6124DFADBE2}" type="datetime1">
               <a:rPr lang="en-US" smtClean="0"/>
-              <a:t>6/16/2022</a:t>
+              <a:t>6/18/2022</a:t>
             </a:fld>
             <a:endParaRPr lang="en-US" dirty="0"/>
           </a:p>
@@ -14723,7 +14728,7 @@
           <a:p>
             <a:fld id="{D9DF0F1C-5577-4ACB-BB62-DF8F3C494C7E}" type="datetime1">
               <a:rPr lang="en-US" smtClean="0"/>
-              <a:t>6/16/2022</a:t>
+              <a:t>6/18/2022</a:t>
             </a:fld>
             <a:endParaRPr lang="en-US" dirty="0"/>
           </a:p>
@@ -14859,7 +14864,7 @@
           <a:p>
             <a:fld id="{1775B394-D9F9-4F0C-B15D-605F45CB9E9F}" type="datetime1">
               <a:rPr lang="en-US" smtClean="0"/>
-              <a:t>6/16/2022</a:t>
+              <a:t>6/18/2022</a:t>
             </a:fld>
             <a:endParaRPr lang="en-US" dirty="0"/>
           </a:p>
@@ -15016,7 +15021,7 @@
           <a:p>
             <a:fld id="{39667345-2558-425A-8533-9BFDBCE15005}" type="datetime1">
               <a:rPr lang="en-US" smtClean="0"/>
-              <a:t>6/16/2022</a:t>
+              <a:t>6/18/2022</a:t>
             </a:fld>
             <a:endParaRPr lang="en-US" dirty="0"/>
           </a:p>
@@ -15345,7 +15350,7 @@
           <a:p>
             <a:fld id="{92BEA474-078D-4E9B-9B14-09A87B19DC46}" type="datetime1">
               <a:rPr lang="en-US" smtClean="0"/>
-              <a:t>6/16/2022</a:t>
+              <a:t>6/18/2022</a:t>
             </a:fld>
             <a:endParaRPr lang="en-US" dirty="0"/>
           </a:p>
@@ -15695,7 +15700,7 @@
           <a:p>
             <a:fld id="{4907D986-8816-4272-A432-0437A28A9828}" type="datetime1">
               <a:rPr lang="en-US" smtClean="0"/>
-              <a:t>6/16/2022</a:t>
+              <a:t>6/18/2022</a:t>
             </a:fld>
             <a:endParaRPr lang="en-US" dirty="0"/>
           </a:p>
@@ -15956,7 +15961,7 @@
           <a:p>
             <a:fld id="{62D6E202-B606-4609-B914-27C9371A1F6D}" type="datetime1">
               <a:rPr lang="en-US" smtClean="0"/>
-              <a:t>6/16/2022</a:t>
+              <a:t>6/18/2022</a:t>
             </a:fld>
             <a:endParaRPr lang="en-US" dirty="0"/>
           </a:p>
@@ -16632,7 +16637,7 @@
           <a:p>
             <a:fld id="{3C04E684-10F4-4CC3-A0B9-F03AA7BE37CF}" type="datetimeFigureOut">
               <a:rPr lang="en-US" smtClean="0"/>
-              <a:t>6/16/2022</a:t>
+              <a:t>6/18/2022</a:t>
             </a:fld>
             <a:endParaRPr lang="en-US"/>
           </a:p>
@@ -18150,7 +18155,7 @@
           <a:bodyPr/>
           <a:lstStyle/>
           <a:p>
-            <a:endParaRPr lang="de-DE"/>
+            <a:endParaRPr lang="de-DE" dirty="0"/>
           </a:p>
         </p:txBody>
       </p:sp>

</xml_diff>